<commit_message>
fix diploma & practice
</commit_message>
<xml_diff>
--- a/Дипломная работа/Консультации Хоменко/Презентация.pptx
+++ b/Дипломная работа/Консультации Хоменко/Презентация.pptx
@@ -214,7 +214,7 @@
           <a:p>
             <a:fld id="{0752C715-6935-41AD-9984-2334D42D2383}" type="datetimeFigureOut">
               <a:rPr lang="ru-RU" smtClean="0"/>
-              <a:t>22.04.2025</a:t>
+              <a:t>08.05.2025</a:t>
             </a:fld>
             <a:endParaRPr lang="ru-RU"/>
           </a:p>
@@ -794,7 +794,7 @@
           <a:p>
             <a:fld id="{A592AB9E-B3E0-40A8-9D13-59617F3F8A64}" type="datetime1">
               <a:rPr lang="ru-RU" smtClean="0"/>
-              <a:t>22.04.2025</a:t>
+              <a:t>08.05.2025</a:t>
             </a:fld>
             <a:endParaRPr lang="ru-RU"/>
           </a:p>
@@ -1140,7 +1140,7 @@
           <a:p>
             <a:fld id="{5417B1CA-4C4F-4F8D-803D-8A6A8A906241}" type="datetime1">
               <a:rPr lang="ru-RU" smtClean="0"/>
-              <a:t>22.04.2025</a:t>
+              <a:t>08.05.2025</a:t>
             </a:fld>
             <a:endParaRPr lang="ru-RU"/>
           </a:p>
@@ -1418,7 +1418,7 @@
           <a:p>
             <a:fld id="{82CFFC90-8D51-4E14-AFBA-129AE5402BF2}" type="datetime1">
               <a:rPr lang="ru-RU" smtClean="0"/>
-              <a:t>22.04.2025</a:t>
+              <a:t>08.05.2025</a:t>
             </a:fld>
             <a:endParaRPr lang="ru-RU"/>
           </a:p>
@@ -1986,7 +1986,7 @@
           <a:p>
             <a:fld id="{EA467253-3793-4A20-98DF-36EA880F85F5}" type="datetime1">
               <a:rPr lang="ru-RU" smtClean="0"/>
-              <a:t>22.04.2025</a:t>
+              <a:t>08.05.2025</a:t>
             </a:fld>
             <a:endParaRPr lang="ru-RU"/>
           </a:p>
@@ -2264,7 +2264,7 @@
           <a:p>
             <a:fld id="{D83AF644-49BB-4732-B227-064E7E8E9B75}" type="datetime1">
               <a:rPr lang="ru-RU" smtClean="0"/>
-              <a:t>22.04.2025</a:t>
+              <a:t>08.05.2025</a:t>
             </a:fld>
             <a:endParaRPr lang="ru-RU"/>
           </a:p>
@@ -2826,7 +2826,7 @@
           <a:p>
             <a:fld id="{93741DF7-081A-43E1-AEC0-7A6A5EFC3E04}" type="datetime1">
               <a:rPr lang="ru-RU" smtClean="0"/>
-              <a:t>22.04.2025</a:t>
+              <a:t>08.05.2025</a:t>
             </a:fld>
             <a:endParaRPr lang="ru-RU"/>
           </a:p>
@@ -3153,7 +3153,7 @@
           <a:p>
             <a:fld id="{60804587-5AD3-4566-AED6-7C5642B16C64}" type="datetime1">
               <a:rPr lang="ru-RU" smtClean="0"/>
-              <a:t>22.04.2025</a:t>
+              <a:t>08.05.2025</a:t>
             </a:fld>
             <a:endParaRPr lang="ru-RU"/>
           </a:p>
@@ -3330,7 +3330,7 @@
           <a:p>
             <a:fld id="{AF148D8C-8A56-4364-A29B-FC848D70BD3E}" type="datetime1">
               <a:rPr lang="ru-RU" smtClean="0"/>
-              <a:t>22.04.2025</a:t>
+              <a:t>08.05.2025</a:t>
             </a:fld>
             <a:endParaRPr lang="ru-RU"/>
           </a:p>
@@ -3580,7 +3580,7 @@
           <a:p>
             <a:fld id="{1F560C62-4747-4C40-80B5-9506A6478873}" type="datetime1">
               <a:rPr lang="ru-RU" smtClean="0"/>
-              <a:t>22.04.2025</a:t>
+              <a:t>08.05.2025</a:t>
             </a:fld>
             <a:endParaRPr lang="ru-RU"/>
           </a:p>
@@ -3792,7 +3792,7 @@
           <a:p>
             <a:fld id="{655C5391-6D11-49BE-9D35-F1852430608C}" type="datetime1">
               <a:rPr lang="ru-RU" smtClean="0"/>
-              <a:t>22.04.2025</a:t>
+              <a:t>08.05.2025</a:t>
             </a:fld>
             <a:endParaRPr lang="ru-RU"/>
           </a:p>
@@ -4080,7 +4080,7 @@
           <a:p>
             <a:fld id="{D1B7E046-787A-42F0-988E-D94C46E094ED}" type="datetime1">
               <a:rPr lang="ru-RU" smtClean="0"/>
-              <a:t>22.04.2025</a:t>
+              <a:t>08.05.2025</a:t>
             </a:fld>
             <a:endParaRPr lang="ru-RU"/>
           </a:p>
@@ -4358,7 +4358,7 @@
           <a:p>
             <a:fld id="{1DEF2D25-E9E1-4E54-81F0-1D2FE8854B0E}" type="datetime1">
               <a:rPr lang="ru-RU" smtClean="0"/>
-              <a:t>22.04.2025</a:t>
+              <a:t>08.05.2025</a:t>
             </a:fld>
             <a:endParaRPr lang="ru-RU"/>
           </a:p>
@@ -4744,7 +4744,7 @@
           <a:p>
             <a:fld id="{2D559C09-903E-4473-BBE2-D44EED2E9BB9}" type="datetime1">
               <a:rPr lang="ru-RU" smtClean="0"/>
-              <a:t>22.04.2025</a:t>
+              <a:t>08.05.2025</a:t>
             </a:fld>
             <a:endParaRPr lang="ru-RU"/>
           </a:p>
@@ -4904,7 +4904,7 @@
           <a:p>
             <a:fld id="{5DEFB42A-193B-4E6D-9002-E4C3450AA4B1}" type="datetime1">
               <a:rPr lang="ru-RU" smtClean="0"/>
-              <a:t>22.04.2025</a:t>
+              <a:t>08.05.2025</a:t>
             </a:fld>
             <a:endParaRPr lang="ru-RU"/>
           </a:p>
@@ -5041,7 +5041,7 @@
           <a:p>
             <a:fld id="{B780A1C7-BCFA-4491-ABEA-F198E9E80238}" type="datetime1">
               <a:rPr lang="ru-RU" smtClean="0"/>
-              <a:t>22.04.2025</a:t>
+              <a:t>08.05.2025</a:t>
             </a:fld>
             <a:endParaRPr lang="ru-RU"/>
           </a:p>
@@ -5338,7 +5338,7 @@
           <a:p>
             <a:fld id="{6B7D87D1-A00E-4856-B035-ABE302A2367C}" type="datetime1">
               <a:rPr lang="ru-RU" smtClean="0"/>
-              <a:t>22.04.2025</a:t>
+              <a:t>08.05.2025</a:t>
             </a:fld>
             <a:endParaRPr lang="ru-RU"/>
           </a:p>
@@ -5674,7 +5674,7 @@
           <a:p>
             <a:fld id="{95982220-A412-481B-B026-9F63F21200E0}" type="datetime1">
               <a:rPr lang="ru-RU" smtClean="0"/>
-              <a:t>22.04.2025</a:t>
+              <a:t>08.05.2025</a:t>
             </a:fld>
             <a:endParaRPr lang="ru-RU"/>
           </a:p>
@@ -5900,7 +5900,7 @@
           <a:p>
             <a:fld id="{CBF3DBF7-CC75-4132-A774-E3960ACCECD6}" type="datetime1">
               <a:rPr lang="ru-RU" smtClean="0"/>
-              <a:t>22.04.2025</a:t>
+              <a:t>08.05.2025</a:t>
             </a:fld>
             <a:endParaRPr lang="ru-RU"/>
           </a:p>
@@ -12511,6 +12511,36 @@
           </a:p>
         </p:txBody>
       </p:sp>
+      <p:pic>
+        <p:nvPicPr>
+          <p:cNvPr id="3" name="Рисунок 2">
+            <a:extLst>
+              <a:ext uri="{FF2B5EF4-FFF2-40B4-BE49-F238E27FC236}">
+                <a16:creationId xmlns:a16="http://schemas.microsoft.com/office/drawing/2014/main" id="{03921933-52A3-0F96-9FB0-AE9928E969F7}"/>
+              </a:ext>
+            </a:extLst>
+          </p:cNvPr>
+          <p:cNvPicPr>
+            <a:picLocks noChangeAspect="1"/>
+          </p:cNvPicPr>
+          <p:nvPr/>
+        </p:nvPicPr>
+        <p:blipFill>
+          <a:blip r:embed="rId2"/>
+          <a:stretch>
+            <a:fillRect/>
+          </a:stretch>
+        </p:blipFill>
+        <p:spPr>
+          <a:xfrm>
+            <a:off x="3494886" y="740664"/>
+            <a:ext cx="5202227" cy="6099048"/>
+          </a:xfrm>
+          <a:prstGeom prst="rect">
+            <a:avLst/>
+          </a:prstGeom>
+        </p:spPr>
+      </p:pic>
     </p:spTree>
     <p:extLst>
       <p:ext uri="{BB962C8B-B14F-4D97-AF65-F5344CB8AC3E}">

</xml_diff>

<commit_message>
fix presentations & speech
</commit_message>
<xml_diff>
--- a/Дипломная работа/Консультации Хоменко/Презентация.pptx
+++ b/Дипломная работа/Консультации Хоменко/Презентация.pptx
@@ -214,7 +214,7 @@
           <a:p>
             <a:fld id="{0752C715-6935-41AD-9984-2334D42D2383}" type="datetimeFigureOut">
               <a:rPr lang="ru-RU" smtClean="0"/>
-              <a:t>10.05.2025</a:t>
+              <a:t>11.05.2025</a:t>
             </a:fld>
             <a:endParaRPr lang="ru-RU"/>
           </a:p>
@@ -794,7 +794,7 @@
           <a:p>
             <a:fld id="{A592AB9E-B3E0-40A8-9D13-59617F3F8A64}" type="datetime1">
               <a:rPr lang="ru-RU" smtClean="0"/>
-              <a:t>10.05.2025</a:t>
+              <a:t>11.05.2025</a:t>
             </a:fld>
             <a:endParaRPr lang="ru-RU"/>
           </a:p>
@@ -1140,7 +1140,7 @@
           <a:p>
             <a:fld id="{5417B1CA-4C4F-4F8D-803D-8A6A8A906241}" type="datetime1">
               <a:rPr lang="ru-RU" smtClean="0"/>
-              <a:t>10.05.2025</a:t>
+              <a:t>11.05.2025</a:t>
             </a:fld>
             <a:endParaRPr lang="ru-RU"/>
           </a:p>
@@ -1418,7 +1418,7 @@
           <a:p>
             <a:fld id="{82CFFC90-8D51-4E14-AFBA-129AE5402BF2}" type="datetime1">
               <a:rPr lang="ru-RU" smtClean="0"/>
-              <a:t>10.05.2025</a:t>
+              <a:t>11.05.2025</a:t>
             </a:fld>
             <a:endParaRPr lang="ru-RU"/>
           </a:p>
@@ -1986,7 +1986,7 @@
           <a:p>
             <a:fld id="{EA467253-3793-4A20-98DF-36EA880F85F5}" type="datetime1">
               <a:rPr lang="ru-RU" smtClean="0"/>
-              <a:t>10.05.2025</a:t>
+              <a:t>11.05.2025</a:t>
             </a:fld>
             <a:endParaRPr lang="ru-RU"/>
           </a:p>
@@ -2264,7 +2264,7 @@
           <a:p>
             <a:fld id="{D83AF644-49BB-4732-B227-064E7E8E9B75}" type="datetime1">
               <a:rPr lang="ru-RU" smtClean="0"/>
-              <a:t>10.05.2025</a:t>
+              <a:t>11.05.2025</a:t>
             </a:fld>
             <a:endParaRPr lang="ru-RU"/>
           </a:p>
@@ -2826,7 +2826,7 @@
           <a:p>
             <a:fld id="{93741DF7-081A-43E1-AEC0-7A6A5EFC3E04}" type="datetime1">
               <a:rPr lang="ru-RU" smtClean="0"/>
-              <a:t>10.05.2025</a:t>
+              <a:t>11.05.2025</a:t>
             </a:fld>
             <a:endParaRPr lang="ru-RU"/>
           </a:p>
@@ -3153,7 +3153,7 @@
           <a:p>
             <a:fld id="{60804587-5AD3-4566-AED6-7C5642B16C64}" type="datetime1">
               <a:rPr lang="ru-RU" smtClean="0"/>
-              <a:t>10.05.2025</a:t>
+              <a:t>11.05.2025</a:t>
             </a:fld>
             <a:endParaRPr lang="ru-RU"/>
           </a:p>
@@ -3330,7 +3330,7 @@
           <a:p>
             <a:fld id="{AF148D8C-8A56-4364-A29B-FC848D70BD3E}" type="datetime1">
               <a:rPr lang="ru-RU" smtClean="0"/>
-              <a:t>10.05.2025</a:t>
+              <a:t>11.05.2025</a:t>
             </a:fld>
             <a:endParaRPr lang="ru-RU"/>
           </a:p>
@@ -3580,7 +3580,7 @@
           <a:p>
             <a:fld id="{1F560C62-4747-4C40-80B5-9506A6478873}" type="datetime1">
               <a:rPr lang="ru-RU" smtClean="0"/>
-              <a:t>10.05.2025</a:t>
+              <a:t>11.05.2025</a:t>
             </a:fld>
             <a:endParaRPr lang="ru-RU"/>
           </a:p>
@@ -3792,7 +3792,7 @@
           <a:p>
             <a:fld id="{655C5391-6D11-49BE-9D35-F1852430608C}" type="datetime1">
               <a:rPr lang="ru-RU" smtClean="0"/>
-              <a:t>10.05.2025</a:t>
+              <a:t>11.05.2025</a:t>
             </a:fld>
             <a:endParaRPr lang="ru-RU"/>
           </a:p>
@@ -4080,7 +4080,7 @@
           <a:p>
             <a:fld id="{D1B7E046-787A-42F0-988E-D94C46E094ED}" type="datetime1">
               <a:rPr lang="ru-RU" smtClean="0"/>
-              <a:t>10.05.2025</a:t>
+              <a:t>11.05.2025</a:t>
             </a:fld>
             <a:endParaRPr lang="ru-RU"/>
           </a:p>
@@ -4358,7 +4358,7 @@
           <a:p>
             <a:fld id="{1DEF2D25-E9E1-4E54-81F0-1D2FE8854B0E}" type="datetime1">
               <a:rPr lang="ru-RU" smtClean="0"/>
-              <a:t>10.05.2025</a:t>
+              <a:t>11.05.2025</a:t>
             </a:fld>
             <a:endParaRPr lang="ru-RU"/>
           </a:p>
@@ -4744,7 +4744,7 @@
           <a:p>
             <a:fld id="{2D559C09-903E-4473-BBE2-D44EED2E9BB9}" type="datetime1">
               <a:rPr lang="ru-RU" smtClean="0"/>
-              <a:t>10.05.2025</a:t>
+              <a:t>11.05.2025</a:t>
             </a:fld>
             <a:endParaRPr lang="ru-RU"/>
           </a:p>
@@ -4904,7 +4904,7 @@
           <a:p>
             <a:fld id="{5DEFB42A-193B-4E6D-9002-E4C3450AA4B1}" type="datetime1">
               <a:rPr lang="ru-RU" smtClean="0"/>
-              <a:t>10.05.2025</a:t>
+              <a:t>11.05.2025</a:t>
             </a:fld>
             <a:endParaRPr lang="ru-RU"/>
           </a:p>
@@ -5041,7 +5041,7 @@
           <a:p>
             <a:fld id="{B780A1C7-BCFA-4491-ABEA-F198E9E80238}" type="datetime1">
               <a:rPr lang="ru-RU" smtClean="0"/>
-              <a:t>10.05.2025</a:t>
+              <a:t>11.05.2025</a:t>
             </a:fld>
             <a:endParaRPr lang="ru-RU"/>
           </a:p>
@@ -5338,7 +5338,7 @@
           <a:p>
             <a:fld id="{6B7D87D1-A00E-4856-B035-ABE302A2367C}" type="datetime1">
               <a:rPr lang="ru-RU" smtClean="0"/>
-              <a:t>10.05.2025</a:t>
+              <a:t>11.05.2025</a:t>
             </a:fld>
             <a:endParaRPr lang="ru-RU"/>
           </a:p>
@@ -5674,7 +5674,7 @@
           <a:p>
             <a:fld id="{95982220-A412-481B-B026-9F63F21200E0}" type="datetime1">
               <a:rPr lang="ru-RU" smtClean="0"/>
-              <a:t>10.05.2025</a:t>
+              <a:t>11.05.2025</a:t>
             </a:fld>
             <a:endParaRPr lang="ru-RU"/>
           </a:p>
@@ -5900,7 +5900,7 @@
           <a:p>
             <a:fld id="{CBF3DBF7-CC75-4132-A774-E3960ACCECD6}" type="datetime1">
               <a:rPr lang="ru-RU" smtClean="0"/>
-              <a:t>10.05.2025</a:t>
+              <a:t>11.05.2025</a:t>
             </a:fld>
             <a:endParaRPr lang="ru-RU"/>
           </a:p>
@@ -11364,49 +11364,7 @@
                 <a:latin typeface="Times New Roman" panose="02020603050405020304" pitchFamily="18" charset="0"/>
                 <a:cs typeface="Times New Roman" panose="02020603050405020304" pitchFamily="18" charset="0"/>
               </a:rPr>
-              <a:t>Около </a:t>
-            </a:r>
-            <a:r>
-              <a:rPr lang="en-US" sz="2200" dirty="0">
-                <a:latin typeface="Times New Roman" panose="02020603050405020304" pitchFamily="18" charset="0"/>
-                <a:cs typeface="Times New Roman" panose="02020603050405020304" pitchFamily="18" charset="0"/>
-              </a:rPr>
-              <a:t>X</a:t>
-            </a:r>
-            <a:r>
-              <a:rPr lang="ru-RU" sz="2200" dirty="0">
-                <a:latin typeface="Times New Roman" panose="02020603050405020304" pitchFamily="18" charset="0"/>
-                <a:cs typeface="Times New Roman" panose="02020603050405020304" pitchFamily="18" charset="0"/>
-              </a:rPr>
-              <a:t> классов (</a:t>
-            </a:r>
-            <a:r>
-              <a:rPr lang="en-US" sz="2200" dirty="0">
-                <a:latin typeface="Times New Roman" panose="02020603050405020304" pitchFamily="18" charset="0"/>
-                <a:cs typeface="Times New Roman" panose="02020603050405020304" pitchFamily="18" charset="0"/>
-              </a:rPr>
-              <a:t>X</a:t>
-            </a:r>
-            <a:r>
-              <a:rPr lang="ru-RU" sz="2200" dirty="0">
-                <a:latin typeface="Times New Roman" panose="02020603050405020304" pitchFamily="18" charset="0"/>
-                <a:cs typeface="Times New Roman" panose="02020603050405020304" pitchFamily="18" charset="0"/>
-              </a:rPr>
-              <a:t> основных и </a:t>
-            </a:r>
-            <a:r>
-              <a:rPr lang="en-US" sz="2200" dirty="0">
-                <a:latin typeface="Times New Roman" panose="02020603050405020304" pitchFamily="18" charset="0"/>
-                <a:cs typeface="Times New Roman" panose="02020603050405020304" pitchFamily="18" charset="0"/>
-              </a:rPr>
-              <a:t>X</a:t>
-            </a:r>
-            <a:r>
-              <a:rPr lang="ru-RU" sz="2200" dirty="0">
-                <a:latin typeface="Times New Roman" panose="02020603050405020304" pitchFamily="18" charset="0"/>
-                <a:cs typeface="Times New Roman" panose="02020603050405020304" pitchFamily="18" charset="0"/>
-              </a:rPr>
-              <a:t> служебных)</a:t>
+              <a:t>Более 100 классов (около 60 основных и 40 служебных)</a:t>
             </a:r>
           </a:p>
         </p:txBody>
@@ -13142,19 +13100,8 @@
                 <a:latin typeface="Times New Roman" panose="02020603050405020304" pitchFamily="18" charset="0"/>
                 <a:cs typeface="Times New Roman" panose="02020603050405020304" pitchFamily="18" charset="0"/>
               </a:rPr>
-              <a:t>Предметная </a:t>
-            </a:r>
-            <a:r>
-              <a:rPr lang="ru-RU" dirty="0" err="1">
-                <a:latin typeface="Times New Roman" panose="02020603050405020304" pitchFamily="18" charset="0"/>
-                <a:cs typeface="Times New Roman" panose="02020603050405020304" pitchFamily="18" charset="0"/>
-              </a:rPr>
-              <a:t>областЬ</a:t>
-            </a:r>
-            <a:endParaRPr lang="ru-RU" dirty="0">
-              <a:latin typeface="Times New Roman" panose="02020603050405020304" pitchFamily="18" charset="0"/>
-              <a:cs typeface="Times New Roman" panose="02020603050405020304" pitchFamily="18" charset="0"/>
-            </a:endParaRPr>
+              <a:t>ДЕЯТЕЛЬНОСТЬ ОРГАНИЗАЦИИ</a:t>
+            </a:r>
           </a:p>
         </p:txBody>
       </p:sp>
@@ -14584,12 +14531,47 @@
           </a:p>
         </p:txBody>
       </p:sp>
+      <p:sp>
+        <p:nvSpPr>
+          <p:cNvPr id="45" name="TextBox 44">
+            <a:extLst>
+              <a:ext uri="{FF2B5EF4-FFF2-40B4-BE49-F238E27FC236}">
+                <a16:creationId xmlns:a16="http://schemas.microsoft.com/office/drawing/2014/main" id="{84036D9F-FBFA-3E72-EDAB-7AA7DF2871DE}"/>
+              </a:ext>
+            </a:extLst>
+          </p:cNvPr>
+          <p:cNvSpPr txBox="1"/>
+          <p:nvPr/>
+        </p:nvSpPr>
+        <p:spPr>
+          <a:xfrm>
+            <a:off x="8668355" y="5152144"/>
+            <a:ext cx="1285582" cy="369332"/>
+          </a:xfrm>
+          <a:prstGeom prst="rect">
+            <a:avLst/>
+          </a:prstGeom>
+          <a:noFill/>
+        </p:spPr>
+        <p:txBody>
+          <a:bodyPr wrap="square" rtlCol="0">
+            <a:spAutoFit/>
+          </a:bodyPr>
+          <a:lstStyle/>
+          <a:p>
+            <a:r>
+              <a:rPr lang="ru-RU" dirty="0"/>
+              <a:t>Команда</a:t>
+            </a:r>
+          </a:p>
+        </p:txBody>
+      </p:sp>
       <p:pic>
         <p:nvPicPr>
-          <p:cNvPr id="41" name="Picture 4" descr="Сертификат – Бесплатные иконки: образование">
-            <a:extLst>
-              <a:ext uri="{FF2B5EF4-FFF2-40B4-BE49-F238E27FC236}">
-                <a16:creationId xmlns:a16="http://schemas.microsoft.com/office/drawing/2014/main" id="{40595BB1-528E-D072-6D17-626D3EAA966A}"/>
+          <p:cNvPr id="46" name="Picture 8" descr="Иконка Человека Глюка Черном Фоне Creative Footage Your Video Project —  Стоковое видео © woltersmith5@gmail.com #546511744">
+            <a:extLst>
+              <a:ext uri="{FF2B5EF4-FFF2-40B4-BE49-F238E27FC236}">
+                <a16:creationId xmlns:a16="http://schemas.microsoft.com/office/drawing/2014/main" id="{1D9D7099-0A2D-F0C4-6D6A-2D5B3D2A5ECD}"/>
               </a:ext>
             </a:extLst>
           </p:cNvPr>
@@ -14599,8 +14581,17 @@
           <p:nvPr/>
         </p:nvPicPr>
         <p:blipFill>
-          <a:blip r:embed="rId4">
-            <a:extLst>
+          <a:blip r:embed="rId2">
+            <a:extLst>
+              <a:ext uri="{BEBA8EAE-BF5A-486C-A8C5-ECC9F3942E4B}">
+                <a14:imgProps xmlns:a14="http://schemas.microsoft.com/office/drawing/2010/main">
+                  <a14:imgLayer r:embed="rId3">
+                    <a14:imgEffect>
+                      <a14:backgroundRemoval t="10000" b="90000" l="10000" r="90000"/>
+                    </a14:imgEffect>
+                  </a14:imgLayer>
+                </a14:imgProps>
+              </a:ext>
               <a:ext uri="{28A0092B-C50C-407E-A947-70E740481C1C}">
                 <a14:useLocalDpi xmlns:a14="http://schemas.microsoft.com/office/drawing/2010/main" val="0"/>
               </a:ext>
@@ -14613,8 +14604,8 @@
         </p:blipFill>
         <p:spPr bwMode="auto">
           <a:xfrm>
-            <a:off x="11112954" y="5461196"/>
-            <a:ext cx="377826" cy="377826"/>
+            <a:off x="9203353" y="5284290"/>
+            <a:ext cx="1384400" cy="952012"/>
           </a:xfrm>
           <a:prstGeom prst="rect">
             <a:avLst/>
@@ -14631,12 +14622,103 @@
           </a:extLst>
         </p:spPr>
       </p:pic>
-      <p:sp>
-        <p:nvSpPr>
-          <p:cNvPr id="43" name="Стрелка: вверх-вниз 42">
-            <a:extLst>
-              <a:ext uri="{FF2B5EF4-FFF2-40B4-BE49-F238E27FC236}">
-                <a16:creationId xmlns:a16="http://schemas.microsoft.com/office/drawing/2014/main" id="{206A340B-8EA8-DDBE-1F6E-E65582D70661}"/>
+      <p:pic>
+        <p:nvPicPr>
+          <p:cNvPr id="47" name="Picture 8" descr="Иконка Человека Глюка Черном Фоне Creative Footage Your Video Project —  Стоковое видео © woltersmith5@gmail.com #546511744">
+            <a:extLst>
+              <a:ext uri="{FF2B5EF4-FFF2-40B4-BE49-F238E27FC236}">
+                <a16:creationId xmlns:a16="http://schemas.microsoft.com/office/drawing/2014/main" id="{7F22B57F-D1B9-48AF-CE81-8CC07555CEA7}"/>
+              </a:ext>
+            </a:extLst>
+          </p:cNvPr>
+          <p:cNvPicPr>
+            <a:picLocks noChangeAspect="1" noChangeArrowheads="1"/>
+          </p:cNvPicPr>
+          <p:nvPr/>
+        </p:nvPicPr>
+        <p:blipFill>
+          <a:blip r:embed="rId2">
+            <a:extLst>
+              <a:ext uri="{BEBA8EAE-BF5A-486C-A8C5-ECC9F3942E4B}">
+                <a14:imgProps xmlns:a14="http://schemas.microsoft.com/office/drawing/2010/main">
+                  <a14:imgLayer r:embed="rId3">
+                    <a14:imgEffect>
+                      <a14:backgroundRemoval t="10000" b="90000" l="10000" r="90000"/>
+                    </a14:imgEffect>
+                  </a14:imgLayer>
+                </a14:imgProps>
+              </a:ext>
+              <a:ext uri="{28A0092B-C50C-407E-A947-70E740481C1C}">
+                <a14:useLocalDpi xmlns:a14="http://schemas.microsoft.com/office/drawing/2010/main" val="0"/>
+              </a:ext>
+            </a:extLst>
+          </a:blip>
+          <a:srcRect/>
+          <a:stretch>
+            <a:fillRect/>
+          </a:stretch>
+        </p:blipFill>
+        <p:spPr bwMode="auto">
+          <a:xfrm>
+            <a:off x="8831298" y="5298860"/>
+            <a:ext cx="1338341" cy="920339"/>
+          </a:xfrm>
+          <a:prstGeom prst="rect">
+            <a:avLst/>
+          </a:prstGeom>
+          <a:noFill/>
+          <a:extLst>
+            <a:ext uri="{909E8E84-426E-40DD-AFC4-6F175D3DCCD1}">
+              <a14:hiddenFill xmlns:a14="http://schemas.microsoft.com/office/drawing/2010/main">
+                <a:solidFill>
+                  <a:srgbClr val="FFFFFF"/>
+                </a:solidFill>
+              </a14:hiddenFill>
+            </a:ext>
+          </a:extLst>
+        </p:spPr>
+      </p:pic>
+      <p:sp>
+        <p:nvSpPr>
+          <p:cNvPr id="49" name="TextBox 48">
+            <a:extLst>
+              <a:ext uri="{FF2B5EF4-FFF2-40B4-BE49-F238E27FC236}">
+                <a16:creationId xmlns:a16="http://schemas.microsoft.com/office/drawing/2014/main" id="{6BFEF9D9-BD35-7071-E1C7-5CE90B8666ED}"/>
+              </a:ext>
+            </a:extLst>
+          </p:cNvPr>
+          <p:cNvSpPr txBox="1"/>
+          <p:nvPr/>
+        </p:nvSpPr>
+        <p:spPr>
+          <a:xfrm>
+            <a:off x="9625787" y="5147675"/>
+            <a:ext cx="1022877" cy="369332"/>
+          </a:xfrm>
+          <a:prstGeom prst="rect">
+            <a:avLst/>
+          </a:prstGeom>
+          <a:noFill/>
+        </p:spPr>
+        <p:txBody>
+          <a:bodyPr wrap="square" rtlCol="0">
+            <a:spAutoFit/>
+          </a:bodyPr>
+          <a:lstStyle/>
+          <a:p>
+            <a:r>
+              <a:rPr lang="ru-RU" dirty="0"/>
+              <a:t>Ученики</a:t>
+            </a:r>
+          </a:p>
+        </p:txBody>
+      </p:sp>
+      <p:sp>
+        <p:nvSpPr>
+          <p:cNvPr id="51" name="Стрелка: вверх-вниз 50">
+            <a:extLst>
+              <a:ext uri="{FF2B5EF4-FFF2-40B4-BE49-F238E27FC236}">
+                <a16:creationId xmlns:a16="http://schemas.microsoft.com/office/drawing/2014/main" id="{C7C735A6-1105-EE1D-0F04-15CD6F39A611}"/>
               </a:ext>
             </a:extLst>
           </p:cNvPr>
@@ -14644,13 +14726,13 @@
           <p:nvPr/>
         </p:nvSpPr>
         <p:spPr>
-          <a:xfrm rot="5400000">
-            <a:off x="10770170" y="5433524"/>
-            <a:ext cx="200453" cy="485113"/>
+          <a:xfrm>
+            <a:off x="9188342" y="2220414"/>
+            <a:ext cx="200453" cy="279765"/>
           </a:xfrm>
           <a:prstGeom prst="upDownArrow">
             <a:avLst>
-              <a:gd name="adj1" fmla="val 50000"/>
+              <a:gd name="adj1" fmla="val 30993"/>
               <a:gd name="adj2" fmla="val 50000"/>
             </a:avLst>
           </a:prstGeom>
@@ -14690,227 +14772,10 @@
       </p:sp>
       <p:sp>
         <p:nvSpPr>
-          <p:cNvPr id="44" name="TextBox 43">
-            <a:extLst>
-              <a:ext uri="{FF2B5EF4-FFF2-40B4-BE49-F238E27FC236}">
-                <a16:creationId xmlns:a16="http://schemas.microsoft.com/office/drawing/2014/main" id="{3EECF613-5A0B-91AF-9EFB-AE5849B0FC37}"/>
-              </a:ext>
-            </a:extLst>
-          </p:cNvPr>
-          <p:cNvSpPr txBox="1"/>
-          <p:nvPr/>
-        </p:nvSpPr>
-        <p:spPr>
-          <a:xfrm>
-            <a:off x="10648664" y="5810206"/>
-            <a:ext cx="1323305" cy="369332"/>
-          </a:xfrm>
-          <a:prstGeom prst="rect">
-            <a:avLst/>
-          </a:prstGeom>
-          <a:noFill/>
-        </p:spPr>
-        <p:txBody>
-          <a:bodyPr wrap="square" rtlCol="0">
-            <a:spAutoFit/>
-          </a:bodyPr>
-          <a:lstStyle/>
-          <a:p>
-            <a:r>
-              <a:rPr lang="ru-RU" dirty="0"/>
-              <a:t>Сертификат</a:t>
-            </a:r>
-          </a:p>
-        </p:txBody>
-      </p:sp>
-      <p:sp>
-        <p:nvSpPr>
-          <p:cNvPr id="45" name="TextBox 44">
-            <a:extLst>
-              <a:ext uri="{FF2B5EF4-FFF2-40B4-BE49-F238E27FC236}">
-                <a16:creationId xmlns:a16="http://schemas.microsoft.com/office/drawing/2014/main" id="{84036D9F-FBFA-3E72-EDAB-7AA7DF2871DE}"/>
-              </a:ext>
-            </a:extLst>
-          </p:cNvPr>
-          <p:cNvSpPr txBox="1"/>
-          <p:nvPr/>
-        </p:nvSpPr>
-        <p:spPr>
-          <a:xfrm>
-            <a:off x="8668355" y="5152144"/>
-            <a:ext cx="1285582" cy="369332"/>
-          </a:xfrm>
-          <a:prstGeom prst="rect">
-            <a:avLst/>
-          </a:prstGeom>
-          <a:noFill/>
-        </p:spPr>
-        <p:txBody>
-          <a:bodyPr wrap="square" rtlCol="0">
-            <a:spAutoFit/>
-          </a:bodyPr>
-          <a:lstStyle/>
-          <a:p>
-            <a:r>
-              <a:rPr lang="ru-RU" dirty="0"/>
-              <a:t>Команда</a:t>
-            </a:r>
-          </a:p>
-        </p:txBody>
-      </p:sp>
-      <p:pic>
-        <p:nvPicPr>
-          <p:cNvPr id="46" name="Picture 8" descr="Иконка Человека Глюка Черном Фоне Creative Footage Your Video Project —  Стоковое видео © woltersmith5@gmail.com #546511744">
-            <a:extLst>
-              <a:ext uri="{FF2B5EF4-FFF2-40B4-BE49-F238E27FC236}">
-                <a16:creationId xmlns:a16="http://schemas.microsoft.com/office/drawing/2014/main" id="{1D9D7099-0A2D-F0C4-6D6A-2D5B3D2A5ECD}"/>
-              </a:ext>
-            </a:extLst>
-          </p:cNvPr>
-          <p:cNvPicPr>
-            <a:picLocks noChangeAspect="1" noChangeArrowheads="1"/>
-          </p:cNvPicPr>
-          <p:nvPr/>
-        </p:nvPicPr>
-        <p:blipFill>
-          <a:blip r:embed="rId2">
-            <a:extLst>
-              <a:ext uri="{BEBA8EAE-BF5A-486C-A8C5-ECC9F3942E4B}">
-                <a14:imgProps xmlns:a14="http://schemas.microsoft.com/office/drawing/2010/main">
-                  <a14:imgLayer r:embed="rId3">
-                    <a14:imgEffect>
-                      <a14:backgroundRemoval t="10000" b="90000" l="10000" r="90000"/>
-                    </a14:imgEffect>
-                  </a14:imgLayer>
-                </a14:imgProps>
-              </a:ext>
-              <a:ext uri="{28A0092B-C50C-407E-A947-70E740481C1C}">
-                <a14:useLocalDpi xmlns:a14="http://schemas.microsoft.com/office/drawing/2010/main" val="0"/>
-              </a:ext>
-            </a:extLst>
-          </a:blip>
-          <a:srcRect/>
-          <a:stretch>
-            <a:fillRect/>
-          </a:stretch>
-        </p:blipFill>
-        <p:spPr bwMode="auto">
-          <a:xfrm>
-            <a:off x="9203353" y="5284290"/>
-            <a:ext cx="1384400" cy="952012"/>
-          </a:xfrm>
-          <a:prstGeom prst="rect">
-            <a:avLst/>
-          </a:prstGeom>
-          <a:noFill/>
-          <a:extLst>
-            <a:ext uri="{909E8E84-426E-40DD-AFC4-6F175D3DCCD1}">
-              <a14:hiddenFill xmlns:a14="http://schemas.microsoft.com/office/drawing/2010/main">
-                <a:solidFill>
-                  <a:srgbClr val="FFFFFF"/>
-                </a:solidFill>
-              </a14:hiddenFill>
-            </a:ext>
-          </a:extLst>
-        </p:spPr>
-      </p:pic>
-      <p:pic>
-        <p:nvPicPr>
-          <p:cNvPr id="47" name="Picture 8" descr="Иконка Человека Глюка Черном Фоне Creative Footage Your Video Project —  Стоковое видео © woltersmith5@gmail.com #546511744">
-            <a:extLst>
-              <a:ext uri="{FF2B5EF4-FFF2-40B4-BE49-F238E27FC236}">
-                <a16:creationId xmlns:a16="http://schemas.microsoft.com/office/drawing/2014/main" id="{7F22B57F-D1B9-48AF-CE81-8CC07555CEA7}"/>
-              </a:ext>
-            </a:extLst>
-          </p:cNvPr>
-          <p:cNvPicPr>
-            <a:picLocks noChangeAspect="1" noChangeArrowheads="1"/>
-          </p:cNvPicPr>
-          <p:nvPr/>
-        </p:nvPicPr>
-        <p:blipFill>
-          <a:blip r:embed="rId2">
-            <a:extLst>
-              <a:ext uri="{BEBA8EAE-BF5A-486C-A8C5-ECC9F3942E4B}">
-                <a14:imgProps xmlns:a14="http://schemas.microsoft.com/office/drawing/2010/main">
-                  <a14:imgLayer r:embed="rId3">
-                    <a14:imgEffect>
-                      <a14:backgroundRemoval t="10000" b="90000" l="10000" r="90000"/>
-                    </a14:imgEffect>
-                  </a14:imgLayer>
-                </a14:imgProps>
-              </a:ext>
-              <a:ext uri="{28A0092B-C50C-407E-A947-70E740481C1C}">
-                <a14:useLocalDpi xmlns:a14="http://schemas.microsoft.com/office/drawing/2010/main" val="0"/>
-              </a:ext>
-            </a:extLst>
-          </a:blip>
-          <a:srcRect/>
-          <a:stretch>
-            <a:fillRect/>
-          </a:stretch>
-        </p:blipFill>
-        <p:spPr bwMode="auto">
-          <a:xfrm>
-            <a:off x="8831298" y="5298860"/>
-            <a:ext cx="1338341" cy="920339"/>
-          </a:xfrm>
-          <a:prstGeom prst="rect">
-            <a:avLst/>
-          </a:prstGeom>
-          <a:noFill/>
-          <a:extLst>
-            <a:ext uri="{909E8E84-426E-40DD-AFC4-6F175D3DCCD1}">
-              <a14:hiddenFill xmlns:a14="http://schemas.microsoft.com/office/drawing/2010/main">
-                <a:solidFill>
-                  <a:srgbClr val="FFFFFF"/>
-                </a:solidFill>
-              </a14:hiddenFill>
-            </a:ext>
-          </a:extLst>
-        </p:spPr>
-      </p:pic>
-      <p:sp>
-        <p:nvSpPr>
-          <p:cNvPr id="49" name="TextBox 48">
-            <a:extLst>
-              <a:ext uri="{FF2B5EF4-FFF2-40B4-BE49-F238E27FC236}">
-                <a16:creationId xmlns:a16="http://schemas.microsoft.com/office/drawing/2014/main" id="{6BFEF9D9-BD35-7071-E1C7-5CE90B8666ED}"/>
-              </a:ext>
-            </a:extLst>
-          </p:cNvPr>
-          <p:cNvSpPr txBox="1"/>
-          <p:nvPr/>
-        </p:nvSpPr>
-        <p:spPr>
-          <a:xfrm>
-            <a:off x="9625787" y="5147675"/>
-            <a:ext cx="1022877" cy="369332"/>
-          </a:xfrm>
-          <a:prstGeom prst="rect">
-            <a:avLst/>
-          </a:prstGeom>
-          <a:noFill/>
-        </p:spPr>
-        <p:txBody>
-          <a:bodyPr wrap="square" rtlCol="0">
-            <a:spAutoFit/>
-          </a:bodyPr>
-          <a:lstStyle/>
-          <a:p>
-            <a:r>
-              <a:rPr lang="ru-RU" dirty="0"/>
-              <a:t>Ученики</a:t>
-            </a:r>
-          </a:p>
-        </p:txBody>
-      </p:sp>
-      <p:sp>
-        <p:nvSpPr>
-          <p:cNvPr id="51" name="Стрелка: вверх-вниз 50">
-            <a:extLst>
-              <a:ext uri="{FF2B5EF4-FFF2-40B4-BE49-F238E27FC236}">
-                <a16:creationId xmlns:a16="http://schemas.microsoft.com/office/drawing/2014/main" id="{C7C735A6-1105-EE1D-0F04-15CD6F39A611}"/>
+          <p:cNvPr id="53" name="Стрелка: влево-вправо 52">
+            <a:extLst>
+              <a:ext uri="{FF2B5EF4-FFF2-40B4-BE49-F238E27FC236}">
+                <a16:creationId xmlns:a16="http://schemas.microsoft.com/office/drawing/2014/main" id="{0E58FD55-1ECC-54CF-3224-606C3E349730}"/>
               </a:ext>
             </a:extLst>
           </p:cNvPr>
@@ -14919,13 +14784,13 @@
         </p:nvSpPr>
         <p:spPr>
           <a:xfrm>
-            <a:off x="9188342" y="2220414"/>
-            <a:ext cx="200453" cy="279765"/>
-          </a:xfrm>
-          <a:prstGeom prst="upDownArrow">
+            <a:off x="7718773" y="5515979"/>
+            <a:ext cx="981739" cy="374319"/>
+          </a:xfrm>
+          <a:prstGeom prst="leftRightArrow">
             <a:avLst>
-              <a:gd name="adj1" fmla="val 30993"/>
-              <a:gd name="adj2" fmla="val 50000"/>
+              <a:gd name="adj1" fmla="val 37234"/>
+              <a:gd name="adj2" fmla="val 46997"/>
             </a:avLst>
           </a:prstGeom>
           <a:solidFill>
@@ -14958,16 +14823,191 @@
           <a:lstStyle/>
           <a:p>
             <a:pPr algn="ctr"/>
-            <a:endParaRPr lang="ru-RU"/>
-          </a:p>
-        </p:txBody>
-      </p:sp>
-      <p:sp>
-        <p:nvSpPr>
-          <p:cNvPr id="53" name="Стрелка: влево-вправо 52">
-            <a:extLst>
-              <a:ext uri="{FF2B5EF4-FFF2-40B4-BE49-F238E27FC236}">
-                <a16:creationId xmlns:a16="http://schemas.microsoft.com/office/drawing/2014/main" id="{0E58FD55-1ECC-54CF-3224-606C3E349730}"/>
+            <a:endParaRPr lang="ru-RU" dirty="0"/>
+          </a:p>
+        </p:txBody>
+      </p:sp>
+      <p:sp>
+        <p:nvSpPr>
+          <p:cNvPr id="54" name="TextBox 53">
+            <a:extLst>
+              <a:ext uri="{FF2B5EF4-FFF2-40B4-BE49-F238E27FC236}">
+                <a16:creationId xmlns:a16="http://schemas.microsoft.com/office/drawing/2014/main" id="{6052C840-F162-C87A-CC69-94F844A5D4D3}"/>
+              </a:ext>
+            </a:extLst>
+          </p:cNvPr>
+          <p:cNvSpPr txBox="1"/>
+          <p:nvPr/>
+        </p:nvSpPr>
+        <p:spPr>
+          <a:xfrm>
+            <a:off x="8965974" y="1586958"/>
+            <a:ext cx="1082031" cy="369332"/>
+          </a:xfrm>
+          <a:prstGeom prst="rect">
+            <a:avLst/>
+          </a:prstGeom>
+          <a:noFill/>
+        </p:spPr>
+        <p:txBody>
+          <a:bodyPr wrap="square" rtlCol="0">
+            <a:spAutoFit/>
+          </a:bodyPr>
+          <a:lstStyle/>
+          <a:p>
+            <a:r>
+              <a:rPr lang="ru-RU" dirty="0"/>
+              <a:t>Урок</a:t>
+            </a:r>
+          </a:p>
+        </p:txBody>
+      </p:sp>
+      <p:sp>
+        <p:nvSpPr>
+          <p:cNvPr id="55" name="Номер слайда 4">
+            <a:extLst>
+              <a:ext uri="{FF2B5EF4-FFF2-40B4-BE49-F238E27FC236}">
+                <a16:creationId xmlns:a16="http://schemas.microsoft.com/office/drawing/2014/main" id="{1FD00073-5066-D6C6-DAA5-2CBD29C17172}"/>
+              </a:ext>
+            </a:extLst>
+          </p:cNvPr>
+          <p:cNvSpPr txBox="1">
+            <a:spLocks/>
+          </p:cNvSpPr>
+          <p:nvPr/>
+        </p:nvSpPr>
+        <p:spPr>
+          <a:xfrm>
+            <a:off x="11171852" y="0"/>
+            <a:ext cx="1020148" cy="658368"/>
+          </a:xfrm>
+          <a:prstGeom prst="rect">
+            <a:avLst/>
+          </a:prstGeom>
+        </p:spPr>
+        <p:txBody>
+          <a:bodyPr vert="horz" lIns="91440" tIns="45720" rIns="91440" bIns="45720" rtlCol="0" anchor="ctr"/>
+          <a:lstStyle>
+            <a:defPPr>
+              <a:defRPr lang="en-US"/>
+            </a:defPPr>
+            <a:lvl1pPr marL="0" algn="r" defTabSz="457200" rtl="0" eaLnBrk="1" latinLnBrk="0" hangingPunct="1">
+              <a:defRPr sz="1000" b="0" i="0" kern="1200">
+                <a:solidFill>
+                  <a:schemeClr val="tx1"/>
+                </a:solidFill>
+                <a:effectLst/>
+                <a:latin typeface="+mn-lt"/>
+                <a:ea typeface="+mn-ea"/>
+                <a:cs typeface="+mn-cs"/>
+              </a:defRPr>
+            </a:lvl1pPr>
+            <a:lvl2pPr marL="457200" algn="l" defTabSz="457200" rtl="0" eaLnBrk="1" latinLnBrk="0" hangingPunct="1">
+              <a:defRPr sz="1800" kern="1200">
+                <a:solidFill>
+                  <a:schemeClr val="tx1"/>
+                </a:solidFill>
+                <a:latin typeface="+mn-lt"/>
+                <a:ea typeface="+mn-ea"/>
+                <a:cs typeface="+mn-cs"/>
+              </a:defRPr>
+            </a:lvl2pPr>
+            <a:lvl3pPr marL="914400" algn="l" defTabSz="457200" rtl="0" eaLnBrk="1" latinLnBrk="0" hangingPunct="1">
+              <a:defRPr sz="1800" kern="1200">
+                <a:solidFill>
+                  <a:schemeClr val="tx1"/>
+                </a:solidFill>
+                <a:latin typeface="+mn-lt"/>
+                <a:ea typeface="+mn-ea"/>
+                <a:cs typeface="+mn-cs"/>
+              </a:defRPr>
+            </a:lvl3pPr>
+            <a:lvl4pPr marL="1371600" algn="l" defTabSz="457200" rtl="0" eaLnBrk="1" latinLnBrk="0" hangingPunct="1">
+              <a:defRPr sz="1800" kern="1200">
+                <a:solidFill>
+                  <a:schemeClr val="tx1"/>
+                </a:solidFill>
+                <a:latin typeface="+mn-lt"/>
+                <a:ea typeface="+mn-ea"/>
+                <a:cs typeface="+mn-cs"/>
+              </a:defRPr>
+            </a:lvl4pPr>
+            <a:lvl5pPr marL="1828800" algn="l" defTabSz="457200" rtl="0" eaLnBrk="1" latinLnBrk="0" hangingPunct="1">
+              <a:defRPr sz="1800" kern="1200">
+                <a:solidFill>
+                  <a:schemeClr val="tx1"/>
+                </a:solidFill>
+                <a:latin typeface="+mn-lt"/>
+                <a:ea typeface="+mn-ea"/>
+                <a:cs typeface="+mn-cs"/>
+              </a:defRPr>
+            </a:lvl5pPr>
+            <a:lvl6pPr marL="2286000" algn="l" defTabSz="457200" rtl="0" eaLnBrk="1" latinLnBrk="0" hangingPunct="1">
+              <a:defRPr sz="1800" kern="1200">
+                <a:solidFill>
+                  <a:schemeClr val="tx1"/>
+                </a:solidFill>
+                <a:latin typeface="+mn-lt"/>
+                <a:ea typeface="+mn-ea"/>
+                <a:cs typeface="+mn-cs"/>
+              </a:defRPr>
+            </a:lvl6pPr>
+            <a:lvl7pPr marL="2743200" algn="l" defTabSz="457200" rtl="0" eaLnBrk="1" latinLnBrk="0" hangingPunct="1">
+              <a:defRPr sz="1800" kern="1200">
+                <a:solidFill>
+                  <a:schemeClr val="tx1"/>
+                </a:solidFill>
+                <a:latin typeface="+mn-lt"/>
+                <a:ea typeface="+mn-ea"/>
+                <a:cs typeface="+mn-cs"/>
+              </a:defRPr>
+            </a:lvl7pPr>
+            <a:lvl8pPr marL="3200400" algn="l" defTabSz="457200" rtl="0" eaLnBrk="1" latinLnBrk="0" hangingPunct="1">
+              <a:defRPr sz="1800" kern="1200">
+                <a:solidFill>
+                  <a:schemeClr val="tx1"/>
+                </a:solidFill>
+                <a:latin typeface="+mn-lt"/>
+                <a:ea typeface="+mn-ea"/>
+                <a:cs typeface="+mn-cs"/>
+              </a:defRPr>
+            </a:lvl8pPr>
+            <a:lvl9pPr marL="3657600" algn="l" defTabSz="457200" rtl="0" eaLnBrk="1" latinLnBrk="0" hangingPunct="1">
+              <a:defRPr sz="1800" kern="1200">
+                <a:solidFill>
+                  <a:schemeClr val="tx1"/>
+                </a:solidFill>
+                <a:latin typeface="+mn-lt"/>
+                <a:ea typeface="+mn-ea"/>
+                <a:cs typeface="+mn-cs"/>
+              </a:defRPr>
+            </a:lvl9pPr>
+          </a:lstStyle>
+          <a:p>
+            <a:pPr algn="ctr"/>
+            <a:fld id="{E674C0A0-8DE9-4942-9F1B-2332F349D007}" type="slidenum">
+              <a:rPr lang="ru-RU" sz="2200" smtClean="0">
+                <a:latin typeface="Tahoma" panose="020B0604030504040204" pitchFamily="34" charset="0"/>
+                <a:ea typeface="Tahoma" panose="020B0604030504040204" pitchFamily="34" charset="0"/>
+                <a:cs typeface="Tahoma" panose="020B0604030504040204" pitchFamily="34" charset="0"/>
+              </a:rPr>
+              <a:pPr algn="ctr"/>
+              <a:t>3</a:t>
+            </a:fld>
+            <a:endParaRPr lang="ru-RU" sz="2200" dirty="0">
+              <a:latin typeface="Tahoma" panose="020B0604030504040204" pitchFamily="34" charset="0"/>
+              <a:ea typeface="Tahoma" panose="020B0604030504040204" pitchFamily="34" charset="0"/>
+              <a:cs typeface="Tahoma" panose="020B0604030504040204" pitchFamily="34" charset="0"/>
+            </a:endParaRPr>
+          </a:p>
+        </p:txBody>
+      </p:sp>
+      <p:sp>
+        <p:nvSpPr>
+          <p:cNvPr id="56" name="Прямоугольник: скругленные углы 55">
+            <a:extLst>
+              <a:ext uri="{FF2B5EF4-FFF2-40B4-BE49-F238E27FC236}">
+                <a16:creationId xmlns:a16="http://schemas.microsoft.com/office/drawing/2014/main" id="{EF56A9C9-A261-B9C0-9E84-D9B4A295727B}"/>
               </a:ext>
             </a:extLst>
           </p:cNvPr>
@@ -14976,21 +15016,22 @@
         </p:nvSpPr>
         <p:spPr>
           <a:xfrm>
-            <a:off x="7718773" y="5515979"/>
-            <a:ext cx="981739" cy="374319"/>
-          </a:xfrm>
-          <a:prstGeom prst="leftRightArrow">
+            <a:off x="4821304" y="5237554"/>
+            <a:ext cx="1803514" cy="743317"/>
+          </a:xfrm>
+          <a:prstGeom prst="roundRect">
             <a:avLst>
-              <a:gd name="adj1" fmla="val 37234"/>
-              <a:gd name="adj2" fmla="val 46997"/>
+              <a:gd name="adj" fmla="val 6622"/>
             </a:avLst>
           </a:prstGeom>
           <a:solidFill>
-            <a:srgbClr val="00B0F0"/>
+            <a:schemeClr val="tx1">
+              <a:lumMod val="75000"/>
+            </a:schemeClr>
           </a:solidFill>
-          <a:ln>
+          <a:ln w="38100">
             <a:solidFill>
-              <a:srgbClr val="00B0F0"/>
+              <a:srgbClr val="FF0000"/>
             </a:solidFill>
           </a:ln>
         </p:spPr>
@@ -15015,191 +15056,35 @@
           <a:lstStyle/>
           <a:p>
             <a:pPr algn="ctr"/>
-            <a:endParaRPr lang="ru-RU" dirty="0"/>
-          </a:p>
-        </p:txBody>
-      </p:sp>
-      <p:sp>
-        <p:nvSpPr>
-          <p:cNvPr id="54" name="TextBox 53">
-            <a:extLst>
-              <a:ext uri="{FF2B5EF4-FFF2-40B4-BE49-F238E27FC236}">
-                <a16:creationId xmlns:a16="http://schemas.microsoft.com/office/drawing/2014/main" id="{6052C840-F162-C87A-CC69-94F844A5D4D3}"/>
-              </a:ext>
-            </a:extLst>
-          </p:cNvPr>
-          <p:cNvSpPr txBox="1"/>
-          <p:nvPr/>
-        </p:nvSpPr>
-        <p:spPr>
-          <a:xfrm>
-            <a:off x="8965974" y="1586958"/>
-            <a:ext cx="1082031" cy="369332"/>
-          </a:xfrm>
-          <a:prstGeom prst="rect">
-            <a:avLst/>
-          </a:prstGeom>
-          <a:noFill/>
-        </p:spPr>
-        <p:txBody>
-          <a:bodyPr wrap="square" rtlCol="0">
-            <a:spAutoFit/>
-          </a:bodyPr>
-          <a:lstStyle/>
-          <a:p>
             <a:r>
               <a:rPr lang="ru-RU" dirty="0"/>
-              <a:t>Урок</a:t>
-            </a:r>
-          </a:p>
-        </p:txBody>
-      </p:sp>
-      <p:sp>
-        <p:nvSpPr>
-          <p:cNvPr id="55" name="Номер слайда 4">
-            <a:extLst>
-              <a:ext uri="{FF2B5EF4-FFF2-40B4-BE49-F238E27FC236}">
-                <a16:creationId xmlns:a16="http://schemas.microsoft.com/office/drawing/2014/main" id="{1FD00073-5066-D6C6-DAA5-2CBD29C17172}"/>
-              </a:ext>
-            </a:extLst>
-          </p:cNvPr>
-          <p:cNvSpPr txBox="1">
-            <a:spLocks/>
-          </p:cNvSpPr>
-          <p:nvPr/>
-        </p:nvSpPr>
-        <p:spPr>
-          <a:xfrm>
-            <a:off x="11171852" y="0"/>
-            <a:ext cx="1020148" cy="658368"/>
-          </a:xfrm>
-          <a:prstGeom prst="rect">
-            <a:avLst/>
-          </a:prstGeom>
-        </p:spPr>
-        <p:txBody>
-          <a:bodyPr vert="horz" lIns="91440" tIns="45720" rIns="91440" bIns="45720" rtlCol="0" anchor="ctr"/>
-          <a:lstStyle>
-            <a:defPPr>
-              <a:defRPr lang="en-US"/>
-            </a:defPPr>
-            <a:lvl1pPr marL="0" algn="r" defTabSz="457200" rtl="0" eaLnBrk="1" latinLnBrk="0" hangingPunct="1">
-              <a:defRPr sz="1000" b="0" i="0" kern="1200">
-                <a:solidFill>
-                  <a:schemeClr val="tx1"/>
-                </a:solidFill>
-                <a:effectLst/>
-                <a:latin typeface="+mn-lt"/>
-                <a:ea typeface="+mn-ea"/>
-                <a:cs typeface="+mn-cs"/>
-              </a:defRPr>
-            </a:lvl1pPr>
-            <a:lvl2pPr marL="457200" algn="l" defTabSz="457200" rtl="0" eaLnBrk="1" latinLnBrk="0" hangingPunct="1">
-              <a:defRPr sz="1800" kern="1200">
-                <a:solidFill>
-                  <a:schemeClr val="tx1"/>
-                </a:solidFill>
-                <a:latin typeface="+mn-lt"/>
-                <a:ea typeface="+mn-ea"/>
-                <a:cs typeface="+mn-cs"/>
-              </a:defRPr>
-            </a:lvl2pPr>
-            <a:lvl3pPr marL="914400" algn="l" defTabSz="457200" rtl="0" eaLnBrk="1" latinLnBrk="0" hangingPunct="1">
-              <a:defRPr sz="1800" kern="1200">
-                <a:solidFill>
-                  <a:schemeClr val="tx1"/>
-                </a:solidFill>
-                <a:latin typeface="+mn-lt"/>
-                <a:ea typeface="+mn-ea"/>
-                <a:cs typeface="+mn-cs"/>
-              </a:defRPr>
-            </a:lvl3pPr>
-            <a:lvl4pPr marL="1371600" algn="l" defTabSz="457200" rtl="0" eaLnBrk="1" latinLnBrk="0" hangingPunct="1">
-              <a:defRPr sz="1800" kern="1200">
-                <a:solidFill>
-                  <a:schemeClr val="tx1"/>
-                </a:solidFill>
-                <a:latin typeface="+mn-lt"/>
-                <a:ea typeface="+mn-ea"/>
-                <a:cs typeface="+mn-cs"/>
-              </a:defRPr>
-            </a:lvl4pPr>
-            <a:lvl5pPr marL="1828800" algn="l" defTabSz="457200" rtl="0" eaLnBrk="1" latinLnBrk="0" hangingPunct="1">
-              <a:defRPr sz="1800" kern="1200">
-                <a:solidFill>
-                  <a:schemeClr val="tx1"/>
-                </a:solidFill>
-                <a:latin typeface="+mn-lt"/>
-                <a:ea typeface="+mn-ea"/>
-                <a:cs typeface="+mn-cs"/>
-              </a:defRPr>
-            </a:lvl5pPr>
-            <a:lvl6pPr marL="2286000" algn="l" defTabSz="457200" rtl="0" eaLnBrk="1" latinLnBrk="0" hangingPunct="1">
-              <a:defRPr sz="1800" kern="1200">
-                <a:solidFill>
-                  <a:schemeClr val="tx1"/>
-                </a:solidFill>
-                <a:latin typeface="+mn-lt"/>
-                <a:ea typeface="+mn-ea"/>
-                <a:cs typeface="+mn-cs"/>
-              </a:defRPr>
-            </a:lvl6pPr>
-            <a:lvl7pPr marL="2743200" algn="l" defTabSz="457200" rtl="0" eaLnBrk="1" latinLnBrk="0" hangingPunct="1">
-              <a:defRPr sz="1800" kern="1200">
-                <a:solidFill>
-                  <a:schemeClr val="tx1"/>
-                </a:solidFill>
-                <a:latin typeface="+mn-lt"/>
-                <a:ea typeface="+mn-ea"/>
-                <a:cs typeface="+mn-cs"/>
-              </a:defRPr>
-            </a:lvl7pPr>
-            <a:lvl8pPr marL="3200400" algn="l" defTabSz="457200" rtl="0" eaLnBrk="1" latinLnBrk="0" hangingPunct="1">
-              <a:defRPr sz="1800" kern="1200">
-                <a:solidFill>
-                  <a:schemeClr val="tx1"/>
-                </a:solidFill>
-                <a:latin typeface="+mn-lt"/>
-                <a:ea typeface="+mn-ea"/>
-                <a:cs typeface="+mn-cs"/>
-              </a:defRPr>
-            </a:lvl8pPr>
-            <a:lvl9pPr marL="3657600" algn="l" defTabSz="457200" rtl="0" eaLnBrk="1" latinLnBrk="0" hangingPunct="1">
-              <a:defRPr sz="1800" kern="1200">
-                <a:solidFill>
-                  <a:schemeClr val="tx1"/>
-                </a:solidFill>
-                <a:latin typeface="+mn-lt"/>
-                <a:ea typeface="+mn-ea"/>
-                <a:cs typeface="+mn-cs"/>
-              </a:defRPr>
-            </a:lvl9pPr>
-          </a:lstStyle>
-          <a:p>
-            <a:pPr algn="ctr"/>
-            <a:fld id="{E674C0A0-8DE9-4942-9F1B-2332F349D007}" type="slidenum">
-              <a:rPr lang="ru-RU" sz="2200" smtClean="0">
-                <a:latin typeface="Tahoma" panose="020B0604030504040204" pitchFamily="34" charset="0"/>
-                <a:ea typeface="Tahoma" panose="020B0604030504040204" pitchFamily="34" charset="0"/>
-                <a:cs typeface="Tahoma" panose="020B0604030504040204" pitchFamily="34" charset="0"/>
-              </a:rPr>
-              <a:pPr algn="ctr"/>
-              <a:t>3</a:t>
-            </a:fld>
-            <a:endParaRPr lang="ru-RU" sz="2200" dirty="0">
-              <a:latin typeface="Tahoma" panose="020B0604030504040204" pitchFamily="34" charset="0"/>
-              <a:ea typeface="Tahoma" panose="020B0604030504040204" pitchFamily="34" charset="0"/>
-              <a:cs typeface="Tahoma" panose="020B0604030504040204" pitchFamily="34" charset="0"/>
-            </a:endParaRPr>
-          </a:p>
-        </p:txBody>
-      </p:sp>
-      <p:sp>
-        <p:nvSpPr>
-          <p:cNvPr id="56" name="Прямоугольник: скругленные углы 55">
-            <a:extLst>
-              <a:ext uri="{FF2B5EF4-FFF2-40B4-BE49-F238E27FC236}">
-                <a16:creationId xmlns:a16="http://schemas.microsoft.com/office/drawing/2014/main" id="{EF56A9C9-A261-B9C0-9E84-D9B4A295727B}"/>
+              <a:t>Формирование: </a:t>
+            </a:r>
+            <a:r>
+              <a:rPr lang="en-US" dirty="0"/>
+              <a:t>≈</a:t>
+            </a:r>
+            <a:r>
+              <a:rPr lang="ru-RU" dirty="0"/>
+              <a:t>20</a:t>
+            </a:r>
+            <a:r>
+              <a:rPr lang="en-US" dirty="0"/>
+              <a:t> </a:t>
+            </a:r>
+            <a:r>
+              <a:rPr lang="ru-RU" dirty="0"/>
+              <a:t>минут</a:t>
+            </a:r>
+          </a:p>
+        </p:txBody>
+      </p:sp>
+      <p:sp>
+        <p:nvSpPr>
+          <p:cNvPr id="57" name="Прямоугольник: скругленные углы 56">
+            <a:extLst>
+              <a:ext uri="{FF2B5EF4-FFF2-40B4-BE49-F238E27FC236}">
+                <a16:creationId xmlns:a16="http://schemas.microsoft.com/office/drawing/2014/main" id="{61475BEF-0B84-468C-5456-F636846FEE10}"/>
               </a:ext>
             </a:extLst>
           </p:cNvPr>
@@ -15208,8 +15093,8 @@
         </p:nvSpPr>
         <p:spPr>
           <a:xfrm>
-            <a:off x="4821304" y="5237554"/>
-            <a:ext cx="1803514" cy="743317"/>
+            <a:off x="4821304" y="1821021"/>
+            <a:ext cx="1770460" cy="590186"/>
           </a:xfrm>
           <a:prstGeom prst="roundRect">
             <a:avLst>
@@ -15258,7 +15143,7 @@
             </a:r>
             <a:r>
               <a:rPr lang="ru-RU" dirty="0"/>
-              <a:t>20</a:t>
+              <a:t>25</a:t>
             </a:r>
             <a:r>
               <a:rPr lang="en-US" dirty="0"/>
@@ -15273,10 +15158,10 @@
       </p:sp>
       <p:sp>
         <p:nvSpPr>
-          <p:cNvPr id="57" name="Прямоугольник: скругленные углы 56">
-            <a:extLst>
-              <a:ext uri="{FF2B5EF4-FFF2-40B4-BE49-F238E27FC236}">
-                <a16:creationId xmlns:a16="http://schemas.microsoft.com/office/drawing/2014/main" id="{61475BEF-0B84-468C-5456-F636846FEE10}"/>
+          <p:cNvPr id="58" name="Прямоугольник: скругленные углы 57">
+            <a:extLst>
+              <a:ext uri="{FF2B5EF4-FFF2-40B4-BE49-F238E27FC236}">
+                <a16:creationId xmlns:a16="http://schemas.microsoft.com/office/drawing/2014/main" id="{C7ECE06C-4FD0-CED8-F25F-13B91728F3C0}"/>
               </a:ext>
             </a:extLst>
           </p:cNvPr>
@@ -15285,8 +15170,8 @@
         </p:nvSpPr>
         <p:spPr>
           <a:xfrm>
-            <a:off x="4821304" y="1821021"/>
-            <a:ext cx="1770460" cy="590186"/>
+            <a:off x="10406907" y="1923733"/>
+            <a:ext cx="1394441" cy="626177"/>
           </a:xfrm>
           <a:prstGeom prst="roundRect">
             <a:avLst>
@@ -15327,15 +15212,18 @@
             <a:pPr algn="ctr"/>
             <a:r>
               <a:rPr lang="ru-RU" dirty="0"/>
-              <a:t>Формирование: </a:t>
-            </a:r>
+              <a:t>Создание: </a:t>
+            </a:r>
+            <a:br>
+              <a:rPr lang="ru-RU" dirty="0"/>
+            </a:br>
             <a:r>
               <a:rPr lang="en-US" dirty="0"/>
               <a:t>≈</a:t>
             </a:r>
             <a:r>
               <a:rPr lang="ru-RU" dirty="0"/>
-              <a:t>25</a:t>
+              <a:t>30</a:t>
             </a:r>
             <a:r>
               <a:rPr lang="en-US" dirty="0"/>
@@ -15350,10 +15238,10 @@
       </p:sp>
       <p:sp>
         <p:nvSpPr>
-          <p:cNvPr id="58" name="Прямоугольник: скругленные углы 57">
-            <a:extLst>
-              <a:ext uri="{FF2B5EF4-FFF2-40B4-BE49-F238E27FC236}">
-                <a16:creationId xmlns:a16="http://schemas.microsoft.com/office/drawing/2014/main" id="{C7ECE06C-4FD0-CED8-F25F-13B91728F3C0}"/>
+          <p:cNvPr id="60" name="Прямоугольник: скругленные углы 59">
+            <a:extLst>
+              <a:ext uri="{FF2B5EF4-FFF2-40B4-BE49-F238E27FC236}">
+                <a16:creationId xmlns:a16="http://schemas.microsoft.com/office/drawing/2014/main" id="{23A826C7-8D63-08EE-BA98-7224FA6FA430}"/>
               </a:ext>
             </a:extLst>
           </p:cNvPr>
@@ -15362,8 +15250,8 @@
         </p:nvSpPr>
         <p:spPr>
           <a:xfrm>
-            <a:off x="10406907" y="1923733"/>
-            <a:ext cx="1394441" cy="626177"/>
+            <a:off x="10750345" y="3715528"/>
+            <a:ext cx="1282535" cy="543975"/>
           </a:xfrm>
           <a:prstGeom prst="roundRect">
             <a:avLst>
@@ -15415,7 +15303,7 @@
             </a:r>
             <a:r>
               <a:rPr lang="ru-RU" dirty="0"/>
-              <a:t>30</a:t>
+              <a:t>20</a:t>
             </a:r>
             <a:r>
               <a:rPr lang="en-US" dirty="0"/>
@@ -15430,10 +15318,10 @@
       </p:sp>
       <p:sp>
         <p:nvSpPr>
-          <p:cNvPr id="59" name="Прямоугольник: скругленные углы 58">
-            <a:extLst>
-              <a:ext uri="{FF2B5EF4-FFF2-40B4-BE49-F238E27FC236}">
-                <a16:creationId xmlns:a16="http://schemas.microsoft.com/office/drawing/2014/main" id="{973134A6-DE0B-FD22-E1FC-7FF8B6C74C08}"/>
+          <p:cNvPr id="61" name="Прямоугольник: скругленные углы 60">
+            <a:extLst>
+              <a:ext uri="{FF2B5EF4-FFF2-40B4-BE49-F238E27FC236}">
+                <a16:creationId xmlns:a16="http://schemas.microsoft.com/office/drawing/2014/main" id="{5A1F92B0-CB28-FADD-837E-C7F960017BC6}"/>
               </a:ext>
             </a:extLst>
           </p:cNvPr>
@@ -15442,8 +15330,8 @@
         </p:nvSpPr>
         <p:spPr>
           <a:xfrm>
-            <a:off x="10648664" y="4678024"/>
-            <a:ext cx="1219190" cy="691416"/>
+            <a:off x="7683439" y="3754393"/>
+            <a:ext cx="1282535" cy="543975"/>
           </a:xfrm>
           <a:prstGeom prst="roundRect">
             <a:avLst>
@@ -15510,10 +15398,10 @@
       </p:sp>
       <p:sp>
         <p:nvSpPr>
-          <p:cNvPr id="60" name="Прямоугольник: скругленные углы 59">
-            <a:extLst>
-              <a:ext uri="{FF2B5EF4-FFF2-40B4-BE49-F238E27FC236}">
-                <a16:creationId xmlns:a16="http://schemas.microsoft.com/office/drawing/2014/main" id="{23A826C7-8D63-08EE-BA98-7224FA6FA430}"/>
+          <p:cNvPr id="62" name="Прямоугольник: скругленные углы 61">
+            <a:extLst>
+              <a:ext uri="{FF2B5EF4-FFF2-40B4-BE49-F238E27FC236}">
+                <a16:creationId xmlns:a16="http://schemas.microsoft.com/office/drawing/2014/main" id="{E76BDF38-A626-4DFE-FB30-1949148A94A2}"/>
               </a:ext>
             </a:extLst>
           </p:cNvPr>
@@ -15522,167 +15410,7 @@
         </p:nvSpPr>
         <p:spPr>
           <a:xfrm>
-            <a:off x="10750345" y="3715528"/>
-            <a:ext cx="1282535" cy="543975"/>
-          </a:xfrm>
-          <a:prstGeom prst="roundRect">
-            <a:avLst>
-              <a:gd name="adj" fmla="val 6622"/>
-            </a:avLst>
-          </a:prstGeom>
-          <a:solidFill>
-            <a:schemeClr val="tx1">
-              <a:lumMod val="75000"/>
-            </a:schemeClr>
-          </a:solidFill>
-          <a:ln w="38100">
-            <a:solidFill>
-              <a:srgbClr val="FF0000"/>
-            </a:solidFill>
-          </a:ln>
-        </p:spPr>
-        <p:style>
-          <a:lnRef idx="2">
-            <a:schemeClr val="accent1">
-              <a:shade val="15000"/>
-            </a:schemeClr>
-          </a:lnRef>
-          <a:fillRef idx="1">
-            <a:schemeClr val="accent1"/>
-          </a:fillRef>
-          <a:effectRef idx="0">
-            <a:schemeClr val="accent1"/>
-          </a:effectRef>
-          <a:fontRef idx="minor">
-            <a:schemeClr val="lt1"/>
-          </a:fontRef>
-        </p:style>
-        <p:txBody>
-          <a:bodyPr rtlCol="0" anchor="ctr"/>
-          <a:lstStyle/>
-          <a:p>
-            <a:pPr algn="ctr"/>
-            <a:r>
-              <a:rPr lang="ru-RU" dirty="0"/>
-              <a:t>Создание: </a:t>
-            </a:r>
-            <a:br>
-              <a:rPr lang="ru-RU" dirty="0"/>
-            </a:br>
-            <a:r>
-              <a:rPr lang="en-US" dirty="0"/>
-              <a:t>≈</a:t>
-            </a:r>
-            <a:r>
-              <a:rPr lang="ru-RU" dirty="0"/>
-              <a:t>20</a:t>
-            </a:r>
-            <a:r>
-              <a:rPr lang="en-US" dirty="0"/>
-              <a:t> </a:t>
-            </a:r>
-            <a:r>
-              <a:rPr lang="ru-RU" dirty="0"/>
-              <a:t>минут</a:t>
-            </a:r>
-          </a:p>
-        </p:txBody>
-      </p:sp>
-      <p:sp>
-        <p:nvSpPr>
-          <p:cNvPr id="61" name="Прямоугольник: скругленные углы 60">
-            <a:extLst>
-              <a:ext uri="{FF2B5EF4-FFF2-40B4-BE49-F238E27FC236}">
-                <a16:creationId xmlns:a16="http://schemas.microsoft.com/office/drawing/2014/main" id="{5A1F92B0-CB28-FADD-837E-C7F960017BC6}"/>
-              </a:ext>
-            </a:extLst>
-          </p:cNvPr>
-          <p:cNvSpPr/>
-          <p:nvPr/>
-        </p:nvSpPr>
-        <p:spPr>
-          <a:xfrm>
-            <a:off x="7683439" y="3754393"/>
-            <a:ext cx="1282535" cy="543975"/>
-          </a:xfrm>
-          <a:prstGeom prst="roundRect">
-            <a:avLst>
-              <a:gd name="adj" fmla="val 6622"/>
-            </a:avLst>
-          </a:prstGeom>
-          <a:solidFill>
-            <a:schemeClr val="tx1">
-              <a:lumMod val="75000"/>
-            </a:schemeClr>
-          </a:solidFill>
-          <a:ln w="38100">
-            <a:solidFill>
-              <a:srgbClr val="FF0000"/>
-            </a:solidFill>
-          </a:ln>
-        </p:spPr>
-        <p:style>
-          <a:lnRef idx="2">
-            <a:schemeClr val="accent1">
-              <a:shade val="15000"/>
-            </a:schemeClr>
-          </a:lnRef>
-          <a:fillRef idx="1">
-            <a:schemeClr val="accent1"/>
-          </a:fillRef>
-          <a:effectRef idx="0">
-            <a:schemeClr val="accent1"/>
-          </a:effectRef>
-          <a:fontRef idx="minor">
-            <a:schemeClr val="lt1"/>
-          </a:fontRef>
-        </p:style>
-        <p:txBody>
-          <a:bodyPr rtlCol="0" anchor="ctr"/>
-          <a:lstStyle/>
-          <a:p>
-            <a:pPr algn="ctr"/>
-            <a:r>
-              <a:rPr lang="ru-RU" dirty="0"/>
-              <a:t>Создание: </a:t>
-            </a:r>
-            <a:br>
-              <a:rPr lang="ru-RU" dirty="0"/>
-            </a:br>
-            <a:r>
-              <a:rPr lang="en-US" dirty="0"/>
-              <a:t>≈</a:t>
-            </a:r>
-            <a:r>
-              <a:rPr lang="ru-RU" dirty="0"/>
-              <a:t>30</a:t>
-            </a:r>
-            <a:r>
-              <a:rPr lang="en-US" dirty="0"/>
-              <a:t> </a:t>
-            </a:r>
-            <a:r>
-              <a:rPr lang="ru-RU" dirty="0"/>
-              <a:t>минут</a:t>
-            </a:r>
-          </a:p>
-        </p:txBody>
-      </p:sp>
-      <p:sp>
-        <p:nvSpPr>
-          <p:cNvPr id="62" name="Прямоугольник: скругленные углы 61">
-            <a:extLst>
-              <a:ext uri="{FF2B5EF4-FFF2-40B4-BE49-F238E27FC236}">
-                <a16:creationId xmlns:a16="http://schemas.microsoft.com/office/drawing/2014/main" id="{E76BDF38-A626-4DFE-FB30-1949148A94A2}"/>
-              </a:ext>
-            </a:extLst>
-          </p:cNvPr>
-          <p:cNvSpPr/>
-          <p:nvPr/>
-        </p:nvSpPr>
-        <p:spPr>
-          <a:xfrm>
-            <a:off x="913853" y="728652"/>
+            <a:off x="782935" y="770639"/>
             <a:ext cx="10768073" cy="5889777"/>
           </a:xfrm>
           <a:prstGeom prst="roundRect">
@@ -17833,7 +17561,7 @@
                             </p:stCondLst>
                             <p:childTnLst>
                               <p:par>
-                                <p:cTn id="139" presetID="10" presetClass="entr" presetSubtype="0" fill="hold" nodeType="clickEffect">
+                                <p:cTn id="139" presetID="14" presetClass="entr" presetSubtype="10" fill="hold" grpId="0" nodeType="clickEffect">
                                   <p:stCondLst>
                                     <p:cond delay="0"/>
                                   </p:stCondLst>
@@ -17841,164 +17569,6 @@
                                     <p:set>
                                       <p:cBhvr>
                                         <p:cTn id="140" dur="1" fill="hold">
-                                          <p:stCondLst>
-                                            <p:cond delay="0"/>
-                                          </p:stCondLst>
-                                        </p:cTn>
-                                        <p:tgtEl>
-                                          <p:spTgt spid="41"/>
-                                        </p:tgtEl>
-                                        <p:attrNameLst>
-                                          <p:attrName>style.visibility</p:attrName>
-                                        </p:attrNameLst>
-                                      </p:cBhvr>
-                                      <p:to>
-                                        <p:strVal val="visible"/>
-                                      </p:to>
-                                    </p:set>
-                                    <p:animEffect transition="in" filter="fade">
-                                      <p:cBhvr>
-                                        <p:cTn id="141" dur="500"/>
-                                        <p:tgtEl>
-                                          <p:spTgt spid="41"/>
-                                        </p:tgtEl>
-                                      </p:cBhvr>
-                                    </p:animEffect>
-                                  </p:childTnLst>
-                                </p:cTn>
-                              </p:par>
-                              <p:par>
-                                <p:cTn id="142" presetID="10" presetClass="entr" presetSubtype="0" fill="hold" grpId="0" nodeType="withEffect">
-                                  <p:stCondLst>
-                                    <p:cond delay="0"/>
-                                  </p:stCondLst>
-                                  <p:childTnLst>
-                                    <p:set>
-                                      <p:cBhvr>
-                                        <p:cTn id="143" dur="1" fill="hold">
-                                          <p:stCondLst>
-                                            <p:cond delay="0"/>
-                                          </p:stCondLst>
-                                        </p:cTn>
-                                        <p:tgtEl>
-                                          <p:spTgt spid="43"/>
-                                        </p:tgtEl>
-                                        <p:attrNameLst>
-                                          <p:attrName>style.visibility</p:attrName>
-                                        </p:attrNameLst>
-                                      </p:cBhvr>
-                                      <p:to>
-                                        <p:strVal val="visible"/>
-                                      </p:to>
-                                    </p:set>
-                                    <p:animEffect transition="in" filter="fade">
-                                      <p:cBhvr>
-                                        <p:cTn id="144" dur="500"/>
-                                        <p:tgtEl>
-                                          <p:spTgt spid="43"/>
-                                        </p:tgtEl>
-                                      </p:cBhvr>
-                                    </p:animEffect>
-                                  </p:childTnLst>
-                                </p:cTn>
-                              </p:par>
-                              <p:par>
-                                <p:cTn id="145" presetID="10" presetClass="entr" presetSubtype="0" fill="hold" grpId="0" nodeType="withEffect">
-                                  <p:stCondLst>
-                                    <p:cond delay="0"/>
-                                  </p:stCondLst>
-                                  <p:childTnLst>
-                                    <p:set>
-                                      <p:cBhvr>
-                                        <p:cTn id="146" dur="1" fill="hold">
-                                          <p:stCondLst>
-                                            <p:cond delay="0"/>
-                                          </p:stCondLst>
-                                        </p:cTn>
-                                        <p:tgtEl>
-                                          <p:spTgt spid="44"/>
-                                        </p:tgtEl>
-                                        <p:attrNameLst>
-                                          <p:attrName>style.visibility</p:attrName>
-                                        </p:attrNameLst>
-                                      </p:cBhvr>
-                                      <p:to>
-                                        <p:strVal val="visible"/>
-                                      </p:to>
-                                    </p:set>
-                                    <p:animEffect transition="in" filter="fade">
-                                      <p:cBhvr>
-                                        <p:cTn id="147" dur="500"/>
-                                        <p:tgtEl>
-                                          <p:spTgt spid="44"/>
-                                        </p:tgtEl>
-                                      </p:cBhvr>
-                                    </p:animEffect>
-                                  </p:childTnLst>
-                                </p:cTn>
-                              </p:par>
-                              <p:par>
-                                <p:cTn id="148" presetID="10" presetClass="entr" presetSubtype="0" fill="hold" grpId="0" nodeType="withEffect">
-                                  <p:stCondLst>
-                                    <p:cond delay="0"/>
-                                  </p:stCondLst>
-                                  <p:childTnLst>
-                                    <p:set>
-                                      <p:cBhvr>
-                                        <p:cTn id="149" dur="1" fill="hold">
-                                          <p:stCondLst>
-                                            <p:cond delay="0"/>
-                                          </p:stCondLst>
-                                        </p:cTn>
-                                        <p:tgtEl>
-                                          <p:spTgt spid="59"/>
-                                        </p:tgtEl>
-                                        <p:attrNameLst>
-                                          <p:attrName>style.visibility</p:attrName>
-                                        </p:attrNameLst>
-                                      </p:cBhvr>
-                                      <p:to>
-                                        <p:strVal val="visible"/>
-                                      </p:to>
-                                    </p:set>
-                                    <p:animEffect transition="in" filter="fade">
-                                      <p:cBhvr>
-                                        <p:cTn id="150" dur="500"/>
-                                        <p:tgtEl>
-                                          <p:spTgt spid="59"/>
-                                        </p:tgtEl>
-                                      </p:cBhvr>
-                                    </p:animEffect>
-                                  </p:childTnLst>
-                                </p:cTn>
-                              </p:par>
-                            </p:childTnLst>
-                          </p:cTn>
-                        </p:par>
-                      </p:childTnLst>
-                    </p:cTn>
-                  </p:par>
-                  <p:par>
-                    <p:cTn id="151" fill="hold">
-                      <p:stCondLst>
-                        <p:cond delay="indefinite"/>
-                      </p:stCondLst>
-                      <p:childTnLst>
-                        <p:par>
-                          <p:cTn id="152" fill="hold">
-                            <p:stCondLst>
-                              <p:cond delay="0"/>
-                            </p:stCondLst>
-                            <p:childTnLst>
-                              <p:par>
-                                <p:cTn id="153" presetID="14" presetClass="entr" presetSubtype="10" fill="hold" grpId="0" nodeType="clickEffect">
-                                  <p:stCondLst>
-                                    <p:cond delay="0"/>
-                                  </p:stCondLst>
-                                  <p:childTnLst>
-                                    <p:set>
-                                      <p:cBhvr>
-                                        <p:cTn id="154" dur="1" fill="hold">
                                           <p:stCondLst>
                                             <p:cond delay="0"/>
                                           </p:stCondLst>
@@ -18016,7 +17586,7 @@
                                     </p:set>
                                     <p:animEffect transition="in" filter="randombar(horizontal)">
                                       <p:cBhvr>
-                                        <p:cTn id="155" dur="500"/>
+                                        <p:cTn id="141" dur="500"/>
                                         <p:tgtEl>
                                           <p:spTgt spid="62"/>
                                         </p:tgtEl>
@@ -18073,8 +17643,6 @@
       <p:bldP spid="36" grpId="0" animBg="1"/>
       <p:bldP spid="39" grpId="0" animBg="1"/>
       <p:bldP spid="40" grpId="0" animBg="1"/>
-      <p:bldP spid="43" grpId="0" animBg="1"/>
-      <p:bldP spid="44" grpId="0"/>
       <p:bldP spid="45" grpId="0"/>
       <p:bldP spid="49" grpId="0"/>
       <p:bldP spid="51" grpId="0" animBg="1"/>
@@ -18083,7 +17651,6 @@
       <p:bldP spid="56" grpId="0" animBg="1"/>
       <p:bldP spid="57" grpId="0" animBg="1"/>
       <p:bldP spid="58" grpId="0" animBg="1"/>
-      <p:bldP spid="59" grpId="0" animBg="1"/>
       <p:bldP spid="60" grpId="0" animBg="1"/>
       <p:bldP spid="61" grpId="0" animBg="1"/>
       <p:bldP spid="62" grpId="0" animBg="1"/>
@@ -18226,7 +17793,7 @@
                 <a:latin typeface="Times New Roman" panose="02020603050405020304" pitchFamily="18" charset="0"/>
                 <a:cs typeface="Times New Roman" panose="02020603050405020304" pitchFamily="18" charset="0"/>
               </a:rPr>
-              <a:t>Предметная область</a:t>
+              <a:t>ПРИКАЗЫ ПО МЕРОПРИЯТИЯМ</a:t>
             </a:r>
           </a:p>
         </p:txBody>
@@ -18477,10 +18044,10 @@
       </p:sp>
       <p:sp>
         <p:nvSpPr>
-          <p:cNvPr id="17" name="Прямоугольник: скругленные углы 16">
-            <a:extLst>
-              <a:ext uri="{FF2B5EF4-FFF2-40B4-BE49-F238E27FC236}">
-                <a16:creationId xmlns:a16="http://schemas.microsoft.com/office/drawing/2014/main" id="{92ECDC32-30B5-2D4A-14E5-8737B0E63A21}"/>
+          <p:cNvPr id="18" name="Прямоугольник: скругленные углы 17">
+            <a:extLst>
+              <a:ext uri="{FF2B5EF4-FFF2-40B4-BE49-F238E27FC236}">
+                <a16:creationId xmlns:a16="http://schemas.microsoft.com/office/drawing/2014/main" id="{BD3017A3-E8CB-BE2A-909F-6052F31FE0BB}"/>
               </a:ext>
             </a:extLst>
           </p:cNvPr>
@@ -18489,68 +18056,7 @@
         </p:nvSpPr>
         <p:spPr>
           <a:xfrm>
-            <a:off x="9635541" y="5556834"/>
-            <a:ext cx="1928196" cy="627482"/>
-          </a:xfrm>
-          <a:prstGeom prst="roundRect">
-            <a:avLst/>
-          </a:prstGeom>
-          <a:solidFill>
-            <a:schemeClr val="tx1"/>
-          </a:solidFill>
-          <a:ln>
-            <a:solidFill>
-              <a:schemeClr val="bg1"/>
-            </a:solidFill>
-          </a:ln>
-        </p:spPr>
-        <p:style>
-          <a:lnRef idx="2">
-            <a:schemeClr val="accent1">
-              <a:shade val="15000"/>
-            </a:schemeClr>
-          </a:lnRef>
-          <a:fillRef idx="1">
-            <a:schemeClr val="accent1"/>
-          </a:fillRef>
-          <a:effectRef idx="0">
-            <a:schemeClr val="accent1"/>
-          </a:effectRef>
-          <a:fontRef idx="minor">
-            <a:schemeClr val="lt1"/>
-          </a:fontRef>
-        </p:style>
-        <p:txBody>
-          <a:bodyPr rtlCol="0" anchor="ctr"/>
-          <a:lstStyle/>
-          <a:p>
-            <a:pPr algn="ctr"/>
-            <a:r>
-              <a:rPr lang="ru-RU" dirty="0">
-                <a:solidFill>
-                  <a:schemeClr val="bg1"/>
-                </a:solidFill>
-              </a:rPr>
-              <a:t>Генерация сертификатов</a:t>
-            </a:r>
-          </a:p>
-        </p:txBody>
-      </p:sp>
-      <p:sp>
-        <p:nvSpPr>
-          <p:cNvPr id="18" name="Прямоугольник: скругленные углы 17">
-            <a:extLst>
-              <a:ext uri="{FF2B5EF4-FFF2-40B4-BE49-F238E27FC236}">
-                <a16:creationId xmlns:a16="http://schemas.microsoft.com/office/drawing/2014/main" id="{BD3017A3-E8CB-BE2A-909F-6052F31FE0BB}"/>
-              </a:ext>
-            </a:extLst>
-          </p:cNvPr>
-          <p:cNvSpPr/>
-          <p:nvPr/>
-        </p:nvSpPr>
-        <p:spPr>
-          <a:xfrm>
-            <a:off x="9635541" y="3947226"/>
+            <a:off x="9577545" y="4739359"/>
             <a:ext cx="1928196" cy="904911"/>
           </a:xfrm>
           <a:prstGeom prst="roundRect">
@@ -19315,52 +18821,9 @@
           <p:nvPr/>
         </p:nvCxnSpPr>
         <p:spPr>
-          <a:xfrm flipV="1">
-            <a:off x="9260205" y="4399682"/>
-            <a:ext cx="375336" cy="789491"/>
-          </a:xfrm>
-          <a:prstGeom prst="bentConnector3">
-            <a:avLst/>
-          </a:prstGeom>
-          <a:ln>
-            <a:tailEnd type="triangle"/>
-          </a:ln>
-        </p:spPr>
-        <p:style>
-          <a:lnRef idx="1">
-            <a:schemeClr val="dk1"/>
-          </a:lnRef>
-          <a:fillRef idx="0">
-            <a:schemeClr val="dk1"/>
-          </a:fillRef>
-          <a:effectRef idx="0">
-            <a:schemeClr val="dk1"/>
-          </a:effectRef>
-          <a:fontRef idx="minor">
-            <a:schemeClr val="tx1"/>
-          </a:fontRef>
-        </p:style>
-      </p:cxnSp>
-      <p:cxnSp>
-        <p:nvCxnSpPr>
-          <p:cNvPr id="73" name="Соединитель: уступ 72">
-            <a:extLst>
-              <a:ext uri="{FF2B5EF4-FFF2-40B4-BE49-F238E27FC236}">
-                <a16:creationId xmlns:a16="http://schemas.microsoft.com/office/drawing/2014/main" id="{A504A750-E5C2-A1D6-DB25-B60B0E49E14D}"/>
-              </a:ext>
-            </a:extLst>
-          </p:cNvPr>
-          <p:cNvCxnSpPr>
-            <a:cxnSpLocks/>
-            <a:stCxn id="19" idx="3"/>
-            <a:endCxn id="17" idx="1"/>
-          </p:cNvCxnSpPr>
-          <p:nvPr/>
-        </p:nvCxnSpPr>
-        <p:spPr>
           <a:xfrm>
             <a:off x="9260205" y="5189173"/>
-            <a:ext cx="375336" cy="681402"/>
+            <a:ext cx="317340" cy="2642"/>
           </a:xfrm>
           <a:prstGeom prst="bentConnector3">
             <a:avLst/>
@@ -19932,7 +19395,7 @@
                 <a:latin typeface="Times New Roman" panose="02020603050405020304" pitchFamily="18" charset="0"/>
                 <a:cs typeface="Times New Roman" panose="02020603050405020304" pitchFamily="18" charset="0"/>
               </a:rPr>
-              <a:t>Предметная область</a:t>
+              <a:t>ПРИКАЗЫ ОБ ОБРАЗОВАТЕЛЬНОЙ ДЕЯТЕЛЬНОСТИ</a:t>
             </a:r>
           </a:p>
         </p:txBody>

</xml_diff>